<commit_message>
Add pet detecion to tla
</commit_message>
<xml_diff>
--- a/SmartHome.PPTX
+++ b/SmartHome.PPTX
@@ -5078,7 +5078,7 @@
         <p:spPr/>
         <p:txBody>
           <a:bodyPr>
-            <a:normAutofit fontScale="92500" lnSpcReduction="20000"/>
+            <a:normAutofit fontScale="92500" lnSpcReduction="10000"/>
           </a:bodyPr>
           <a:lstStyle/>
           <a:p>
@@ -5103,15 +5103,10 @@
           </a:p>
           <a:p>
             <a:r>
-              <a:rPr lang="en-US" dirty="0"/>
-              <a:t>The sounding alarm should only be silenced by entering a correct disarm code or through an authenticated remote command.</a:t>
-            </a:r>
-          </a:p>
-          <a:p>
-            <a:r>
-              <a:rPr lang="en-US" dirty="0"/>
-              <a:t>the motion sensors should not trigger the alarm due to pet movement.</a:t>
-            </a:r>
+              <a:rPr lang="ru-RU" dirty="0"/>
+              <a:t>Датчики движения не должны вызывать срабатывание сигнализации из-за движения домашнего животного.</a:t>
+            </a:r>
+            <a:endParaRPr lang="en-US" dirty="0"/>
           </a:p>
           <a:p>
             <a:r>

</xml_diff>